<commit_message>
acpt: add scenario for _Cell.merge()
</commit_message>
<xml_diff>
--- a/features/steps/test_files/tbl-cell.pptx
+++ b/features/steps/test_files/tbl-cell.pptx
@@ -7,6 +7,7 @@
   <p:sldIdLst>
     <p:sldId id="257" r:id="rId2"/>
     <p:sldId id="256" r:id="rId3"/>
+    <p:sldId id="258" r:id="rId4"/>
   </p:sldIdLst>
   <p:sldSz cx="9144000" cy="6858000" type="screen4x3"/>
   <p:notesSz cx="6858000" cy="9144000"/>
@@ -440,14 +441,14 @@
           <p:nvPr>
             <p:extLst>
               <p:ext uri="{D42A27DB-BD31-4B8C-83A1-F6EECF244321}">
-                <p14:modId xmlns:p14="http://schemas.microsoft.com/office/powerpoint/2010/main" val="4127934796"/>
+                <p14:modId xmlns:p14="http://schemas.microsoft.com/office/powerpoint/2010/main" val="2369131475"/>
               </p:ext>
             </p:extLst>
           </p:nvPr>
         </p:nvGraphicFramePr>
         <p:xfrm>
           <a:off x="1524000" y="1397000"/>
-          <a:ext cx="6096000" cy="2666999"/>
+          <a:ext cx="6096000" cy="2936239"/>
         </p:xfrm>
         <a:graphic>
           <a:graphicData uri="http://schemas.openxmlformats.org/drawingml/2006/table">
@@ -537,7 +538,15 @@
                     <a:bodyPr/>
                     <a:lstStyle/>
                     <a:p>
-                      <a:endParaRPr lang="en-US"/>
+                      <a:r>
+                        <a:rPr lang="en-US" dirty="0" err="1" smtClean="0"/>
+                        <a:t>unladen</a:t>
+                      </a:r>
+                      <a:r>
+                        <a:rPr lang="en-US" dirty="0" smtClean="0"/>
+                        <a:t> swallows</a:t>
+                      </a:r>
+                      <a:endParaRPr lang="en-US" dirty="0"/>
                     </a:p>
                   </a:txBody>
                   <a:tcPr/>
@@ -651,7 +660,7 @@
                     <a:bodyPr/>
                     <a:lstStyle/>
                     <a:p>
-                      <a:endParaRPr lang="en-US"/>
+                      <a:endParaRPr lang="en-US" dirty="0"/>
                     </a:p>
                   </a:txBody>
                   <a:tcPr/>
@@ -1075,6 +1084,201 @@
     <p:extLst>
       <p:ext uri="{BB962C8B-B14F-4D97-AF65-F5344CB8AC3E}">
         <p14:creationId xmlns:p14="http://schemas.microsoft.com/office/powerpoint/2010/main" val="3259449288"/>
+      </p:ext>
+    </p:extLst>
+  </p:cSld>
+  <p:clrMapOvr>
+    <a:masterClrMapping/>
+  </p:clrMapOvr>
+</p:sld>
+</file>
+
+<file path=ppt/slides/slide3.xml><?xml version="1.0" encoding="utf-8"?>
+<p:sld xmlns:a="http://schemas.openxmlformats.org/drawingml/2006/main" xmlns:r="http://schemas.openxmlformats.org/officeDocument/2006/relationships" xmlns:p="http://schemas.openxmlformats.org/presentationml/2006/main">
+  <p:cSld>
+    <p:spTree>
+      <p:nvGrpSpPr>
+        <p:cNvPr id="1" name=""/>
+        <p:cNvGrpSpPr/>
+        <p:nvPr/>
+      </p:nvGrpSpPr>
+      <p:grpSpPr>
+        <a:xfrm>
+          <a:off x="0" y="0"/>
+          <a:ext cx="0" cy="0"/>
+          <a:chOff x="0" y="0"/>
+          <a:chExt cx="0" cy="0"/>
+        </a:xfrm>
+      </p:grpSpPr>
+      <p:graphicFrame>
+        <p:nvGraphicFramePr>
+          <p:cNvPr id="2" name="Table 1"/>
+          <p:cNvGraphicFramePr>
+            <a:graphicFrameLocks noGrp="1"/>
+          </p:cNvGraphicFramePr>
+          <p:nvPr>
+            <p:extLst>
+              <p:ext uri="{D42A27DB-BD31-4B8C-83A1-F6EECF244321}">
+                <p14:modId xmlns:p14="http://schemas.microsoft.com/office/powerpoint/2010/main" val="1252535106"/>
+              </p:ext>
+            </p:extLst>
+          </p:nvPr>
+        </p:nvGraphicFramePr>
+        <p:xfrm>
+          <a:off x="1524000" y="1397000"/>
+          <a:ext cx="6096000" cy="1112520"/>
+        </p:xfrm>
+        <a:graphic>
+          <a:graphicData uri="http://schemas.openxmlformats.org/drawingml/2006/table">
+            <a:tbl>
+              <a:tblPr firstRow="1" bandRow="1">
+                <a:tableStyleId>{D7AC3CCA-C797-4891-BE02-D94E43425B78}</a:tableStyleId>
+              </a:tblPr>
+              <a:tblGrid>
+                <a:gridCol w="2032000"/>
+                <a:gridCol w="2032000"/>
+                <a:gridCol w="2032000"/>
+              </a:tblGrid>
+              <a:tr h="370840">
+                <a:tc>
+                  <a:txBody>
+                    <a:bodyPr/>
+                    <a:lstStyle/>
+                    <a:p>
+                      <a:r>
+                        <a:rPr lang="en-US" dirty="0" smtClean="0"/>
+                        <a:t>a</a:t>
+                      </a:r>
+                      <a:endParaRPr lang="en-US" dirty="0"/>
+                    </a:p>
+                  </a:txBody>
+                  <a:tcPr/>
+                </a:tc>
+                <a:tc>
+                  <a:txBody>
+                    <a:bodyPr/>
+                    <a:lstStyle/>
+                    <a:p>
+                      <a:r>
+                        <a:rPr lang="en-US" dirty="0" smtClean="0"/>
+                        <a:t>b</a:t>
+                      </a:r>
+                      <a:endParaRPr lang="en-US" dirty="0"/>
+                    </a:p>
+                  </a:txBody>
+                  <a:tcPr/>
+                </a:tc>
+                <a:tc>
+                  <a:txBody>
+                    <a:bodyPr/>
+                    <a:lstStyle/>
+                    <a:p>
+                      <a:r>
+                        <a:rPr lang="en-US" dirty="0" smtClean="0"/>
+                        <a:t>c</a:t>
+                      </a:r>
+                      <a:endParaRPr lang="en-US" dirty="0"/>
+                    </a:p>
+                  </a:txBody>
+                  <a:tcPr/>
+                </a:tc>
+              </a:tr>
+              <a:tr h="370840">
+                <a:tc>
+                  <a:txBody>
+                    <a:bodyPr/>
+                    <a:lstStyle/>
+                    <a:p>
+                      <a:r>
+                        <a:rPr lang="en-US" dirty="0" smtClean="0"/>
+                        <a:t>d</a:t>
+                      </a:r>
+                      <a:endParaRPr lang="en-US" dirty="0"/>
+                    </a:p>
+                  </a:txBody>
+                  <a:tcPr/>
+                </a:tc>
+                <a:tc>
+                  <a:txBody>
+                    <a:bodyPr/>
+                    <a:lstStyle/>
+                    <a:p>
+                      <a:r>
+                        <a:rPr lang="en-US" dirty="0" smtClean="0"/>
+                        <a:t>e</a:t>
+                      </a:r>
+                      <a:endParaRPr lang="en-US" dirty="0"/>
+                    </a:p>
+                  </a:txBody>
+                  <a:tcPr/>
+                </a:tc>
+                <a:tc>
+                  <a:txBody>
+                    <a:bodyPr/>
+                    <a:lstStyle/>
+                    <a:p>
+                      <a:r>
+                        <a:rPr lang="en-US" dirty="0" smtClean="0"/>
+                        <a:t>f</a:t>
+                      </a:r>
+                      <a:endParaRPr lang="en-US" dirty="0"/>
+                    </a:p>
+                  </a:txBody>
+                  <a:tcPr/>
+                </a:tc>
+              </a:tr>
+              <a:tr h="370840">
+                <a:tc>
+                  <a:txBody>
+                    <a:bodyPr/>
+                    <a:lstStyle/>
+                    <a:p>
+                      <a:r>
+                        <a:rPr lang="en-US" dirty="0" smtClean="0"/>
+                        <a:t>g</a:t>
+                      </a:r>
+                      <a:endParaRPr lang="en-US" dirty="0"/>
+                    </a:p>
+                  </a:txBody>
+                  <a:tcPr/>
+                </a:tc>
+                <a:tc>
+                  <a:txBody>
+                    <a:bodyPr/>
+                    <a:lstStyle/>
+                    <a:p>
+                      <a:r>
+                        <a:rPr lang="en-US" dirty="0" smtClean="0"/>
+                        <a:t>h</a:t>
+                      </a:r>
+                      <a:endParaRPr lang="en-US" dirty="0"/>
+                    </a:p>
+                  </a:txBody>
+                  <a:tcPr/>
+                </a:tc>
+                <a:tc>
+                  <a:txBody>
+                    <a:bodyPr/>
+                    <a:lstStyle/>
+                    <a:p>
+                      <a:r>
+                        <a:rPr lang="en-US" dirty="0" err="1" smtClean="0"/>
+                        <a:t>i</a:t>
+                      </a:r>
+                      <a:endParaRPr lang="en-US" dirty="0"/>
+                    </a:p>
+                  </a:txBody>
+                  <a:tcPr/>
+                </a:tc>
+              </a:tr>
+            </a:tbl>
+          </a:graphicData>
+        </a:graphic>
+      </p:graphicFrame>
+    </p:spTree>
+    <p:extLst>
+      <p:ext uri="{BB962C8B-B14F-4D97-AF65-F5344CB8AC3E}">
+        <p14:creationId xmlns:p14="http://schemas.microsoft.com/office/powerpoint/2010/main" val="3667667412"/>
       </p:ext>
     </p:extLst>
   </p:cSld>

</xml_diff>